<commit_message>
For 10h30 Demo Powerpoint
</commit_message>
<xml_diff>
--- a/Project Demo/Appsynth Demo One.pptx
+++ b/Project Demo/Appsynth Demo One.pptx
@@ -9,17 +9,16 @@
     <p:sldId id="257" r:id="rId3"/>
     <p:sldId id="258" r:id="rId4"/>
     <p:sldId id="263" r:id="rId5"/>
-    <p:sldId id="260" r:id="rId6"/>
-    <p:sldId id="265" r:id="rId7"/>
-    <p:sldId id="266" r:id="rId8"/>
-    <p:sldId id="267" r:id="rId9"/>
-    <p:sldId id="268" r:id="rId10"/>
-    <p:sldId id="264" r:id="rId11"/>
-    <p:sldId id="269" r:id="rId12"/>
-    <p:sldId id="270" r:id="rId13"/>
-    <p:sldId id="271" r:id="rId14"/>
-    <p:sldId id="272" r:id="rId15"/>
-    <p:sldId id="261" r:id="rId16"/>
+    <p:sldId id="265" r:id="rId6"/>
+    <p:sldId id="266" r:id="rId7"/>
+    <p:sldId id="267" r:id="rId8"/>
+    <p:sldId id="268" r:id="rId9"/>
+    <p:sldId id="269" r:id="rId10"/>
+    <p:sldId id="270" r:id="rId11"/>
+    <p:sldId id="271" r:id="rId12"/>
+    <p:sldId id="272" r:id="rId13"/>
+    <p:sldId id="264" r:id="rId14"/>
+    <p:sldId id="261" r:id="rId15"/>
   </p:sldIdLst>
   <p:sldSz cx="12192000" cy="6858000"/>
   <p:notesSz cx="6858000" cy="9144000"/>
@@ -3008,7 +3007,7 @@
           <a:p>
             <a:fld id="{8A66E8C8-FEB7-48C3-ADFC-7A01EFFA5698}" type="datetimeFigureOut">
               <a:rPr lang="en-US" smtClean="0"/>
-              <a:t>5/25/2017</a:t>
+              <a:t>5/26/2017</a:t>
             </a:fld>
             <a:endParaRPr lang="en-US"/>
           </a:p>
@@ -3346,7 +3345,7 @@
           <a:p>
             <a:fld id="{8A66E8C8-FEB7-48C3-ADFC-7A01EFFA5698}" type="datetimeFigureOut">
               <a:rPr lang="en-US" smtClean="0"/>
-              <a:t>5/25/2017</a:t>
+              <a:t>5/26/2017</a:t>
             </a:fld>
             <a:endParaRPr lang="en-US"/>
           </a:p>
@@ -3747,7 +3746,7 @@
           <a:p>
             <a:fld id="{8A66E8C8-FEB7-48C3-ADFC-7A01EFFA5698}" type="datetimeFigureOut">
               <a:rPr lang="en-US" smtClean="0"/>
-              <a:t>5/25/2017</a:t>
+              <a:t>5/26/2017</a:t>
             </a:fld>
             <a:endParaRPr lang="en-US"/>
           </a:p>
@@ -4083,7 +4082,7 @@
           <a:p>
             <a:fld id="{8A66E8C8-FEB7-48C3-ADFC-7A01EFFA5698}" type="datetimeFigureOut">
               <a:rPr lang="en-US" smtClean="0"/>
-              <a:t>5/25/2017</a:t>
+              <a:t>5/26/2017</a:t>
             </a:fld>
             <a:endParaRPr lang="en-US"/>
           </a:p>
@@ -4403,7 +4402,7 @@
           <a:p>
             <a:fld id="{8A66E8C8-FEB7-48C3-ADFC-7A01EFFA5698}" type="datetimeFigureOut">
               <a:rPr lang="en-US" smtClean="0"/>
-              <a:t>5/25/2017</a:t>
+              <a:t>5/26/2017</a:t>
             </a:fld>
             <a:endParaRPr lang="en-US"/>
           </a:p>
@@ -4799,7 +4798,7 @@
           <a:p>
             <a:fld id="{8A66E8C8-FEB7-48C3-ADFC-7A01EFFA5698}" type="datetimeFigureOut">
               <a:rPr lang="en-US" smtClean="0"/>
-              <a:t>5/25/2017</a:t>
+              <a:t>5/26/2017</a:t>
             </a:fld>
             <a:endParaRPr lang="en-US"/>
           </a:p>
@@ -5056,7 +5055,7 @@
           <a:p>
             <a:fld id="{8A66E8C8-FEB7-48C3-ADFC-7A01EFFA5698}" type="datetimeFigureOut">
               <a:rPr lang="en-US" smtClean="0"/>
-              <a:t>5/25/2017</a:t>
+              <a:t>5/26/2017</a:t>
             </a:fld>
             <a:endParaRPr lang="en-US"/>
           </a:p>
@@ -5318,7 +5317,7 @@
           <a:p>
             <a:fld id="{8A66E8C8-FEB7-48C3-ADFC-7A01EFFA5698}" type="datetimeFigureOut">
               <a:rPr lang="en-US" smtClean="0"/>
-              <a:t>5/25/2017</a:t>
+              <a:t>5/26/2017</a:t>
             </a:fld>
             <a:endParaRPr lang="en-US"/>
           </a:p>
@@ -5580,7 +5579,7 @@
           <a:p>
             <a:fld id="{8A66E8C8-FEB7-48C3-ADFC-7A01EFFA5698}" type="datetimeFigureOut">
               <a:rPr lang="en-US" smtClean="0"/>
-              <a:t>5/25/2017</a:t>
+              <a:t>5/26/2017</a:t>
             </a:fld>
             <a:endParaRPr lang="en-US"/>
           </a:p>
@@ -5909,7 +5908,7 @@
           <a:p>
             <a:fld id="{8A66E8C8-FEB7-48C3-ADFC-7A01EFFA5698}" type="datetimeFigureOut">
               <a:rPr lang="en-US" smtClean="0"/>
-              <a:t>5/25/2017</a:t>
+              <a:t>5/26/2017</a:t>
             </a:fld>
             <a:endParaRPr lang="en-US"/>
           </a:p>
@@ -6232,7 +6231,7 @@
           <a:p>
             <a:fld id="{8A66E8C8-FEB7-48C3-ADFC-7A01EFFA5698}" type="datetimeFigureOut">
               <a:rPr lang="en-US" smtClean="0"/>
-              <a:t>5/25/2017</a:t>
+              <a:t>5/26/2017</a:t>
             </a:fld>
             <a:endParaRPr lang="en-US"/>
           </a:p>
@@ -6689,7 +6688,7 @@
           <a:p>
             <a:fld id="{8A66E8C8-FEB7-48C3-ADFC-7A01EFFA5698}" type="datetimeFigureOut">
               <a:rPr lang="en-US" smtClean="0"/>
-              <a:t>5/25/2017</a:t>
+              <a:t>5/26/2017</a:t>
             </a:fld>
             <a:endParaRPr lang="en-US"/>
           </a:p>
@@ -6894,7 +6893,7 @@
           <a:p>
             <a:fld id="{8A66E8C8-FEB7-48C3-ADFC-7A01EFFA5698}" type="datetimeFigureOut">
               <a:rPr lang="en-US" smtClean="0"/>
-              <a:t>5/25/2017</a:t>
+              <a:t>5/26/2017</a:t>
             </a:fld>
             <a:endParaRPr lang="en-US"/>
           </a:p>
@@ -7071,7 +7070,7 @@
           <a:p>
             <a:fld id="{8A66E8C8-FEB7-48C3-ADFC-7A01EFFA5698}" type="datetimeFigureOut">
               <a:rPr lang="en-US" smtClean="0"/>
-              <a:t>5/25/2017</a:t>
+              <a:t>5/26/2017</a:t>
             </a:fld>
             <a:endParaRPr lang="en-US"/>
           </a:p>
@@ -7404,7 +7403,7 @@
           <a:p>
             <a:fld id="{8A66E8C8-FEB7-48C3-ADFC-7A01EFFA5698}" type="datetimeFigureOut">
               <a:rPr lang="en-US" smtClean="0"/>
-              <a:t>5/25/2017</a:t>
+              <a:t>5/26/2017</a:t>
             </a:fld>
             <a:endParaRPr lang="en-US"/>
           </a:p>
@@ -7749,7 +7748,7 @@
           <a:p>
             <a:fld id="{8A66E8C8-FEB7-48C3-ADFC-7A01EFFA5698}" type="datetimeFigureOut">
               <a:rPr lang="en-US" smtClean="0"/>
-              <a:t>5/25/2017</a:t>
+              <a:t>5/26/2017</a:t>
             </a:fld>
             <a:endParaRPr lang="en-US"/>
           </a:p>
@@ -9866,7 +9865,7 @@
           <a:p>
             <a:fld id="{8A66E8C8-FEB7-48C3-ADFC-7A01EFFA5698}" type="datetimeFigureOut">
               <a:rPr lang="en-US" smtClean="0"/>
-              <a:t>5/25/2017</a:t>
+              <a:t>5/26/2017</a:t>
             </a:fld>
             <a:endParaRPr lang="en-US"/>
           </a:p>
@@ -10439,7 +10438,6 @@
               <a:rPr lang="en-US" dirty="0" smtClean="0"/>
               <a:t>App-Synth </a:t>
             </a:r>
-            <a:endParaRPr lang="en-US" dirty="0" smtClean="0"/>
           </a:p>
           <a:p>
             <a:r>
@@ -10526,9 +10524,60 @@
           <a:lstStyle/>
           <a:p>
             <a:r>
+              <a:rPr lang="en-ZA" dirty="0"/>
+              <a:t>External Interface Requirements</a:t>
+            </a:r>
+            <a:br>
+              <a:rPr lang="en-ZA" dirty="0"/>
+            </a:br>
+            <a:r>
               <a:rPr lang="en-ZA" dirty="0" smtClean="0"/>
-              <a:t>Demo</a:t>
-            </a:r>
+              <a:t>(</a:t>
+            </a:r>
+            <a:r>
+              <a:rPr lang="en-ZA" dirty="0"/>
+              <a:t>Software </a:t>
+            </a:r>
+            <a:r>
+              <a:rPr lang="en-ZA" dirty="0" smtClean="0"/>
+              <a:t>Requirements</a:t>
+            </a:r>
+            <a:r>
+              <a:rPr lang="en-ZA" dirty="0"/>
+              <a:t>)</a:t>
+            </a:r>
+          </a:p>
+        </p:txBody>
+      </p:sp>
+      <p:sp>
+        <p:nvSpPr>
+          <p:cNvPr id="3" name="Content Placeholder 2"/>
+          <p:cNvSpPr>
+            <a:spLocks noGrp="1"/>
+          </p:cNvSpPr>
+          <p:nvPr>
+            <p:ph idx="1"/>
+          </p:nvPr>
+        </p:nvSpPr>
+        <p:spPr/>
+        <p:txBody>
+          <a:bodyPr/>
+          <a:lstStyle/>
+          <a:p>
+            <a:r>
+              <a:rPr lang="en-ZA" dirty="0"/>
+              <a:t>There are multiple software packages and libraries which will be used within the system in order to implement the required functionality. (Mention a list)The application will need to be compatible with the Google Android operation system, as well the Apple </a:t>
+            </a:r>
+            <a:r>
+              <a:rPr lang="en-ZA" dirty="0" err="1"/>
+              <a:t>iOS</a:t>
+            </a:r>
+            <a:r>
+              <a:rPr lang="en-ZA" dirty="0"/>
+              <a:t> operating system.</a:t>
+            </a:r>
+          </a:p>
+          <a:p>
             <a:endParaRPr lang="en-ZA" dirty="0"/>
           </a:p>
         </p:txBody>
@@ -10536,7 +10585,7 @@
     </p:spTree>
     <p:extLst>
       <p:ext uri="{BB962C8B-B14F-4D97-AF65-F5344CB8AC3E}">
-        <p14:creationId xmlns:p14="http://schemas.microsoft.com/office/powerpoint/2010/main" val="2124565286"/>
+        <p14:creationId xmlns:p14="http://schemas.microsoft.com/office/powerpoint/2010/main" val="137040148"/>
       </p:ext>
     </p:extLst>
   </p:cSld>
@@ -10579,11 +10628,11 @@
           <a:lstStyle/>
           <a:p>
             <a:r>
-              <a:rPr lang="en-ZA" dirty="0" smtClean="0"/>
+              <a:rPr lang="en-ZA" dirty="0"/>
               <a:t>External Interface Requirements</a:t>
             </a:r>
             <a:br>
-              <a:rPr lang="en-ZA" dirty="0" smtClean="0"/>
+              <a:rPr lang="en-ZA" dirty="0"/>
             </a:br>
             <a:r>
               <a:rPr lang="en-ZA" dirty="0" smtClean="0"/>
@@ -10591,13 +10640,16 @@
             </a:r>
             <a:r>
               <a:rPr lang="en-ZA" dirty="0"/>
-              <a:t>Interface </a:t>
+              <a:t>Hardware </a:t>
             </a:r>
             <a:r>
               <a:rPr lang="en-ZA" dirty="0" smtClean="0"/>
-              <a:t>Requirements)</a:t>
-            </a:r>
-            <a:endParaRPr lang="en-ZA" dirty="0"/>
+              <a:t>Requirements</a:t>
+            </a:r>
+            <a:r>
+              <a:rPr lang="en-ZA" dirty="0"/>
+              <a:t>)</a:t>
+            </a:r>
           </a:p>
         </p:txBody>
       </p:sp>
@@ -10618,12 +10670,10 @@
           <a:p>
             <a:r>
               <a:rPr lang="en-ZA" dirty="0"/>
-              <a:t>The main user interface will be in the form of a virtual reality space. Through this space, the user will be able to make various interactions with the system by means of hand gestures. The application itself will have a graphical user interface which the user can make use of in order to alter various configurations of the </a:t>
-            </a:r>
-            <a:r>
-              <a:rPr lang="en-ZA" dirty="0" smtClean="0"/>
-              <a:t>application.</a:t>
-            </a:r>
+              <a:t>The system will require the presence of a virtual reality device in order to allow for a virtual reality space to be displayed. The application will be deployed on a mobile phone. As such, the mobile device should be able to meet the minimum requirements in order to run the virtual reality application.</a:t>
+            </a:r>
+          </a:p>
+          <a:p>
             <a:endParaRPr lang="en-ZA" dirty="0"/>
           </a:p>
         </p:txBody>
@@ -10631,7 +10681,7 @@
     </p:spTree>
     <p:extLst>
       <p:ext uri="{BB962C8B-B14F-4D97-AF65-F5344CB8AC3E}">
-        <p14:creationId xmlns:p14="http://schemas.microsoft.com/office/powerpoint/2010/main" val="2075585378"/>
+        <p14:creationId xmlns:p14="http://schemas.microsoft.com/office/powerpoint/2010/main" val="19761515"/>
       </p:ext>
     </p:extLst>
   </p:cSld>
@@ -10686,7 +10736,7 @@
             </a:r>
             <a:r>
               <a:rPr lang="en-ZA" dirty="0"/>
-              <a:t>Software </a:t>
+              <a:t>Communication </a:t>
             </a:r>
             <a:r>
               <a:rPr lang="en-ZA" dirty="0" smtClean="0"/>
@@ -10716,15 +10766,7 @@
           <a:p>
             <a:r>
               <a:rPr lang="en-ZA" dirty="0"/>
-              <a:t>There are multiple software packages and libraries which will be used within the system in order to implement the required functionality. (Mention a list)The application will need to be compatible with the Google Android operation system, as well the Apple </a:t>
-            </a:r>
-            <a:r>
-              <a:rPr lang="en-ZA" dirty="0" err="1"/>
-              <a:t>iOS</a:t>
-            </a:r>
-            <a:r>
-              <a:rPr lang="en-ZA" dirty="0"/>
-              <a:t> operating system.</a:t>
+              <a:t>There are various components of the system which will have to communicate with one another in order for the system to provide its required functionality. (Mention a list of libraries and how they would need to communicate)</a:t>
             </a:r>
           </a:p>
           <a:p>
@@ -10735,7 +10777,7 @@
     </p:spTree>
     <p:extLst>
       <p:ext uri="{BB962C8B-B14F-4D97-AF65-F5344CB8AC3E}">
-        <p14:creationId xmlns:p14="http://schemas.microsoft.com/office/powerpoint/2010/main" val="137040148"/>
+        <p14:creationId xmlns:p14="http://schemas.microsoft.com/office/powerpoint/2010/main" val="6274091"/>
       </p:ext>
     </p:extLst>
   </p:cSld>
@@ -10778,52 +10820,9 @@
           <a:lstStyle/>
           <a:p>
             <a:r>
-              <a:rPr lang="en-ZA" dirty="0"/>
-              <a:t>External Interface Requirements</a:t>
-            </a:r>
-            <a:br>
-              <a:rPr lang="en-ZA" dirty="0"/>
-            </a:br>
-            <a:r>
               <a:rPr lang="en-ZA" dirty="0" smtClean="0"/>
-              <a:t>(</a:t>
-            </a:r>
-            <a:r>
-              <a:rPr lang="en-ZA" dirty="0"/>
-              <a:t>Hardware </a:t>
-            </a:r>
-            <a:r>
-              <a:rPr lang="en-ZA" dirty="0" smtClean="0"/>
-              <a:t>Requirements</a:t>
-            </a:r>
-            <a:r>
-              <a:rPr lang="en-ZA" dirty="0"/>
-              <a:t>)</a:t>
-            </a:r>
-          </a:p>
-        </p:txBody>
-      </p:sp>
-      <p:sp>
-        <p:nvSpPr>
-          <p:cNvPr id="3" name="Content Placeholder 2"/>
-          <p:cNvSpPr>
-            <a:spLocks noGrp="1"/>
-          </p:cNvSpPr>
-          <p:nvPr>
-            <p:ph idx="1"/>
-          </p:nvPr>
-        </p:nvSpPr>
-        <p:spPr/>
-        <p:txBody>
-          <a:bodyPr/>
-          <a:lstStyle/>
-          <a:p>
-            <a:r>
-              <a:rPr lang="en-ZA" dirty="0"/>
-              <a:t>The system will require the presence of a virtual reality device in order to allow for a virtual reality space to be displayed. The application will be deployed on a mobile phone. As such, the mobile device should be able to meet the minimum requirements in order to run the virtual reality application.</a:t>
-            </a:r>
-          </a:p>
-          <a:p>
+              <a:t>Demo</a:t>
+            </a:r>
             <a:endParaRPr lang="en-ZA" dirty="0"/>
           </a:p>
         </p:txBody>
@@ -10831,7 +10830,7 @@
     </p:spTree>
     <p:extLst>
       <p:ext uri="{BB962C8B-B14F-4D97-AF65-F5344CB8AC3E}">
-        <p14:creationId xmlns:p14="http://schemas.microsoft.com/office/powerpoint/2010/main" val="19761515"/>
+        <p14:creationId xmlns:p14="http://schemas.microsoft.com/office/powerpoint/2010/main" val="2124565286"/>
       </p:ext>
     </p:extLst>
   </p:cSld>
@@ -10874,28 +10873,10 @@
           <a:lstStyle/>
           <a:p>
             <a:r>
-              <a:rPr lang="en-ZA" dirty="0"/>
-              <a:t>External Interface Requirements</a:t>
-            </a:r>
-            <a:br>
-              <a:rPr lang="en-ZA" dirty="0"/>
-            </a:br>
-            <a:r>
-              <a:rPr lang="en-ZA" dirty="0" smtClean="0"/>
-              <a:t>(</a:t>
-            </a:r>
-            <a:r>
-              <a:rPr lang="en-ZA" dirty="0"/>
-              <a:t>Communication </a:t>
-            </a:r>
-            <a:r>
-              <a:rPr lang="en-ZA" dirty="0" smtClean="0"/>
-              <a:t>Requirements</a:t>
-            </a:r>
-            <a:r>
-              <a:rPr lang="en-ZA" dirty="0"/>
-              <a:t>)</a:t>
-            </a:r>
+              <a:rPr lang="en-US" dirty="0" smtClean="0"/>
+              <a:t>What’s next?</a:t>
+            </a:r>
+            <a:endParaRPr lang="en-US" dirty="0"/>
           </a:p>
         </p:txBody>
       </p:sp>
@@ -10915,103 +10896,16 @@
           <a:lstStyle/>
           <a:p>
             <a:r>
-              <a:rPr lang="en-ZA" dirty="0"/>
-              <a:t>There are various components of the system which will have to communicate with one another in order for the system to provide its required functionality. (Mention a list of libraries and how they would need to communicate)</a:t>
-            </a:r>
-          </a:p>
-          <a:p>
-            <a:endParaRPr lang="en-ZA" dirty="0"/>
-          </a:p>
-        </p:txBody>
-      </p:sp>
-    </p:spTree>
-    <p:extLst>
-      <p:ext uri="{BB962C8B-B14F-4D97-AF65-F5344CB8AC3E}">
-        <p14:creationId xmlns:p14="http://schemas.microsoft.com/office/powerpoint/2010/main" val="6274091"/>
-      </p:ext>
-    </p:extLst>
-  </p:cSld>
-  <p:clrMapOvr>
-    <a:masterClrMapping/>
-  </p:clrMapOvr>
-</p:sld>
-</file>
-
-<file path=ppt/slides/slide15.xml><?xml version="1.0" encoding="utf-8"?>
-<p:sld xmlns:a="http://schemas.openxmlformats.org/drawingml/2006/main" xmlns:r="http://schemas.openxmlformats.org/officeDocument/2006/relationships" xmlns:p="http://schemas.openxmlformats.org/presentationml/2006/main">
-  <p:cSld>
-    <p:spTree>
-      <p:nvGrpSpPr>
-        <p:cNvPr id="1" name=""/>
-        <p:cNvGrpSpPr/>
-        <p:nvPr/>
-      </p:nvGrpSpPr>
-      <p:grpSpPr>
-        <a:xfrm>
-          <a:off x="0" y="0"/>
-          <a:ext cx="0" cy="0"/>
-          <a:chOff x="0" y="0"/>
-          <a:chExt cx="0" cy="0"/>
-        </a:xfrm>
-      </p:grpSpPr>
-      <p:sp>
-        <p:nvSpPr>
-          <p:cNvPr id="2" name="Title 1"/>
-          <p:cNvSpPr>
-            <a:spLocks noGrp="1"/>
-          </p:cNvSpPr>
-          <p:nvPr>
-            <p:ph type="title"/>
-          </p:nvPr>
-        </p:nvSpPr>
-        <p:spPr/>
-        <p:txBody>
-          <a:bodyPr/>
-          <a:lstStyle/>
-          <a:p>
-            <a:r>
               <a:rPr lang="en-US" dirty="0" smtClean="0"/>
-              <a:t>What’s next?</a:t>
-            </a:r>
-            <a:endParaRPr lang="en-US" dirty="0"/>
-          </a:p>
-        </p:txBody>
-      </p:sp>
-      <p:sp>
-        <p:nvSpPr>
-          <p:cNvPr id="3" name="Content Placeholder 2"/>
-          <p:cNvSpPr>
-            <a:spLocks noGrp="1"/>
-          </p:cNvSpPr>
-          <p:nvPr>
-            <p:ph idx="1"/>
-          </p:nvPr>
-        </p:nvSpPr>
-        <p:spPr/>
-        <p:txBody>
-          <a:bodyPr/>
-          <a:lstStyle/>
-          <a:p>
+              <a:t>Intensive Research</a:t>
+            </a:r>
+          </a:p>
+          <a:p>
+            <a:pPr lvl="1"/>
             <a:r>
               <a:rPr lang="en-US" dirty="0" smtClean="0"/>
-              <a:t>Intensive </a:t>
-            </a:r>
-            <a:r>
-              <a:rPr lang="en-US" dirty="0" smtClean="0"/>
-              <a:t>Research</a:t>
-            </a:r>
-          </a:p>
-          <a:p>
-            <a:pPr lvl="1"/>
-            <a:r>
-              <a:rPr lang="en-US" dirty="0" smtClean="0"/>
-              <a:t>On </a:t>
-            </a:r>
-            <a:r>
-              <a:rPr lang="en-US" dirty="0" smtClean="0"/>
-              <a:t>propagating the digraph onto a 3-dimensional space</a:t>
-            </a:r>
-            <a:endParaRPr lang="en-US" dirty="0" smtClean="0"/>
+              <a:t>On propagating the digraph onto a 3-dimensional space</a:t>
+            </a:r>
           </a:p>
           <a:p>
             <a:pPr lvl="1"/>
@@ -11100,11 +10994,7 @@
           <a:p>
             <a:r>
               <a:rPr lang="en-US" sz="2000" dirty="0" smtClean="0"/>
-              <a:t>Create an application that </a:t>
-            </a:r>
-            <a:r>
-              <a:rPr lang="en-US" sz="2000" dirty="0" smtClean="0"/>
-              <a:t>requires virtual 3D digraph visualization propagated onto a spatial 3D virtual reality space.</a:t>
+              <a:t>Create an application that requires virtual 3D digraph visualization propagated onto a spatial 3D virtual reality space.</a:t>
             </a:r>
           </a:p>
           <a:p>
@@ -11116,11 +11006,7 @@
           <a:p>
             <a:r>
               <a:rPr lang="en-US" sz="2000" dirty="0" smtClean="0"/>
-              <a:t>Application should allow user to change viewpoint on 3D plane</a:t>
-            </a:r>
-            <a:r>
-              <a:rPr lang="en-US" sz="2000" dirty="0" smtClean="0"/>
-              <a:t> to allow them to have different views within this dimensional sphere</a:t>
+              <a:t>Application should allow user to change viewpoint on 3D plane to allow them to have different views within this dimensional sphere</a:t>
             </a:r>
           </a:p>
           <a:p>
@@ -11128,7 +11014,6 @@
               <a:rPr lang="en-US" sz="2000" dirty="0" smtClean="0"/>
               <a:t>System should allow the user to manipulate the digraph nodes and edges into different positions and also be able to create, update and delete links/edges between nodes through hand gesture interaction</a:t>
             </a:r>
-            <a:endParaRPr lang="en-US" sz="2000" dirty="0" smtClean="0"/>
           </a:p>
         </p:txBody>
       </p:sp>
@@ -11254,34 +11139,25 @@
           <a:p>
             <a:r>
               <a:rPr lang="en-US" sz="2000" dirty="0" smtClean="0"/>
-              <a:t>On the front-end: The users </a:t>
-            </a:r>
-            <a:r>
-              <a:rPr lang="en-US" sz="2000" dirty="0" smtClean="0"/>
-              <a:t>will</a:t>
-            </a:r>
-            <a:endParaRPr lang="en-US" sz="2000" dirty="0" smtClean="0"/>
+              <a:t>On the front-end: The users will</a:t>
+            </a:r>
           </a:p>
           <a:p>
             <a:r>
               <a:rPr lang="en-US" sz="2000" dirty="0" smtClean="0"/>
               <a:t>On the back-end: There will be </a:t>
             </a:r>
+            <a:endParaRPr lang="en-US" sz="2000" dirty="0" smtClean="0"/>
+          </a:p>
+          <a:p>
             <a:r>
               <a:rPr lang="en-US" sz="2000" dirty="0" smtClean="0"/>
-              <a:t>a web server which takes care of all the heavy processing and sends back information to the app</a:t>
-            </a:r>
-          </a:p>
-          <a:p>
+              <a:t>The </a:t>
+            </a:r>
             <a:r>
               <a:rPr lang="en-US" sz="2000" dirty="0" smtClean="0"/>
-              <a:t>The server will communicate with the </a:t>
-            </a:r>
-            <a:r>
-              <a:rPr lang="en-US" sz="2000" smtClean="0"/>
-              <a:t>app through</a:t>
-            </a:r>
-            <a:endParaRPr lang="en-US" sz="2000" dirty="0" smtClean="0"/>
+              <a:t>server will communicate with the app through</a:t>
+            </a:r>
           </a:p>
         </p:txBody>
       </p:sp>
@@ -11435,10 +11311,10 @@
           <a:lstStyle/>
           <a:p>
             <a:r>
-              <a:rPr lang="en-US" dirty="0" smtClean="0"/>
-              <a:t>Initial Software Architecture</a:t>
-            </a:r>
-            <a:endParaRPr lang="en-US" dirty="0"/>
+              <a:rPr lang="en-ZA" dirty="0" smtClean="0"/>
+              <a:t>Functional Requirements</a:t>
+            </a:r>
+            <a:endParaRPr lang="en-ZA" dirty="0"/>
           </a:p>
         </p:txBody>
       </p:sp>
@@ -11457,14 +11333,61 @@
           <a:bodyPr/>
           <a:lstStyle/>
           <a:p>
-            <a:endParaRPr lang="en-US" dirty="0"/>
+            <a:r>
+              <a:rPr lang="en-ZA" dirty="0"/>
+              <a:t>Load digraph from file into </a:t>
+            </a:r>
+            <a:r>
+              <a:rPr lang="en-ZA" dirty="0" smtClean="0"/>
+              <a:t>space</a:t>
+            </a:r>
+          </a:p>
+          <a:p>
+            <a:r>
+              <a:rPr lang="en-ZA" dirty="0"/>
+              <a:t>Change graph view and </a:t>
+            </a:r>
+            <a:r>
+              <a:rPr lang="en-ZA" dirty="0" smtClean="0"/>
+              <a:t>zoom</a:t>
+            </a:r>
+          </a:p>
+          <a:p>
+            <a:r>
+              <a:rPr lang="en-ZA" dirty="0"/>
+              <a:t>Set criteria for force </a:t>
+            </a:r>
+            <a:r>
+              <a:rPr lang="en-ZA" dirty="0" smtClean="0"/>
+              <a:t>direction</a:t>
+            </a:r>
+          </a:p>
+          <a:p>
+            <a:r>
+              <a:rPr lang="en-ZA" dirty="0" smtClean="0"/>
+              <a:t>Manipulate graph </a:t>
+            </a:r>
+            <a:r>
+              <a:rPr lang="en-ZA" dirty="0"/>
+              <a:t>using hand </a:t>
+            </a:r>
+            <a:r>
+              <a:rPr lang="en-ZA" dirty="0" smtClean="0"/>
+              <a:t>gestures</a:t>
+            </a:r>
+          </a:p>
+          <a:p>
+            <a:r>
+              <a:rPr lang="en-ZA" dirty="0"/>
+              <a:t>Sync graph with external display</a:t>
+            </a:r>
           </a:p>
         </p:txBody>
       </p:sp>
     </p:spTree>
     <p:extLst>
       <p:ext uri="{BB962C8B-B14F-4D97-AF65-F5344CB8AC3E}">
-        <p14:creationId xmlns:p14="http://schemas.microsoft.com/office/powerpoint/2010/main" val="923838427"/>
+        <p14:creationId xmlns:p14="http://schemas.microsoft.com/office/powerpoint/2010/main" val="454719661"/>
       </p:ext>
     </p:extLst>
   </p:cSld>
@@ -11508,7 +11431,7 @@
           <a:p>
             <a:r>
               <a:rPr lang="en-ZA" dirty="0" smtClean="0"/>
-              <a:t>Functional Requirements</a:t>
+              <a:t>Initial Non-Functional Requirements</a:t>
             </a:r>
             <a:endParaRPr lang="en-ZA" dirty="0"/>
           </a:p>
@@ -11531,51 +11454,37 @@
           <a:p>
             <a:r>
               <a:rPr lang="en-ZA" dirty="0"/>
-              <a:t>Load digraph from file into </a:t>
+              <a:t>High performance - Real time communication between view and external </a:t>
             </a:r>
             <a:r>
               <a:rPr lang="en-ZA" dirty="0" smtClean="0"/>
-              <a:t>space</a:t>
+              <a:t>display</a:t>
             </a:r>
           </a:p>
           <a:p>
             <a:r>
               <a:rPr lang="en-ZA" dirty="0"/>
-              <a:t>Change graph view and </a:t>
+              <a:t>Scalability – System must be robust and modular, allowing easy addition of additional </a:t>
             </a:r>
             <a:r>
               <a:rPr lang="en-ZA" dirty="0" smtClean="0"/>
-              <a:t>zoom</a:t>
+              <a:t>features</a:t>
             </a:r>
           </a:p>
           <a:p>
             <a:r>
               <a:rPr lang="en-ZA" dirty="0"/>
-              <a:t>Set criteria for force </a:t>
+              <a:t>Reliability – Ability to track hand movements and capture gestures accurately and adjust graph </a:t>
             </a:r>
             <a:r>
               <a:rPr lang="en-ZA" dirty="0" smtClean="0"/>
-              <a:t>direction</a:t>
-            </a:r>
-          </a:p>
-          <a:p>
-            <a:r>
-              <a:rPr lang="en-ZA" dirty="0" smtClean="0"/>
-              <a:t>Manipulate graph </a:t>
-            </a:r>
+              <a:t>accordingly</a:t>
+            </a:r>
+          </a:p>
+          <a:p>
             <a:r>
               <a:rPr lang="en-ZA" dirty="0"/>
-              <a:t>using hand </a:t>
-            </a:r>
-            <a:r>
-              <a:rPr lang="en-ZA" dirty="0" smtClean="0"/>
-              <a:t>gestures</a:t>
-            </a:r>
-          </a:p>
-          <a:p>
-            <a:r>
-              <a:rPr lang="en-ZA" dirty="0"/>
-              <a:t>Sync graph with external display</a:t>
+              <a:t>Security – Must not inadvertently put user’s information at risk through vulnerabilities</a:t>
             </a:r>
           </a:p>
         </p:txBody>
@@ -11583,7 +11492,7 @@
     </p:spTree>
     <p:extLst>
       <p:ext uri="{BB962C8B-B14F-4D97-AF65-F5344CB8AC3E}">
-        <p14:creationId xmlns:p14="http://schemas.microsoft.com/office/powerpoint/2010/main" val="454719661"/>
+        <p14:creationId xmlns:p14="http://schemas.microsoft.com/office/powerpoint/2010/main" val="354062543"/>
       </p:ext>
     </p:extLst>
   </p:cSld>
@@ -11627,7 +11536,7 @@
           <a:p>
             <a:r>
               <a:rPr lang="en-ZA" dirty="0" smtClean="0"/>
-              <a:t>Initial Non-Functional Requirements</a:t>
+              <a:t>Implementation Details</a:t>
             </a:r>
             <a:endParaRPr lang="en-ZA" dirty="0"/>
           </a:p>
@@ -11650,37 +11559,57 @@
           <a:p>
             <a:r>
               <a:rPr lang="en-ZA" dirty="0"/>
-              <a:t>High performance - Real time communication between view and external </a:t>
+              <a:t>Sigma graph modelling library (java script</a:t>
             </a:r>
             <a:r>
               <a:rPr lang="en-ZA" dirty="0" smtClean="0"/>
-              <a:t>display</a:t>
+              <a:t>)</a:t>
             </a:r>
           </a:p>
           <a:p>
             <a:r>
               <a:rPr lang="en-ZA" dirty="0"/>
-              <a:t>Scalability – System must be robust and modular, allowing easy addition of additional </a:t>
+              <a:t>Create cross platform </a:t>
             </a:r>
             <a:r>
               <a:rPr lang="en-ZA" dirty="0" smtClean="0"/>
-              <a:t>features</a:t>
+              <a:t>application</a:t>
             </a:r>
           </a:p>
           <a:p>
             <a:r>
               <a:rPr lang="en-ZA" dirty="0"/>
-              <a:t>Reliability – Ability to track hand movements and capture gestures accurately and adjust graph </a:t>
+              <a:t>Native cross platforms application (React-Native/Other</a:t>
             </a:r>
             <a:r>
               <a:rPr lang="en-ZA" dirty="0" smtClean="0"/>
-              <a:t>accordingly</a:t>
+              <a:t>)</a:t>
             </a:r>
           </a:p>
           <a:p>
             <a:r>
               <a:rPr lang="en-ZA" dirty="0"/>
-              <a:t>Security – Must not inadvertently put user’s information at risk through vulnerabilities</a:t>
+              <a:t>3JS for creation of 3D </a:t>
+            </a:r>
+            <a:r>
+              <a:rPr lang="en-ZA" dirty="0" smtClean="0"/>
+              <a:t>space</a:t>
+            </a:r>
+          </a:p>
+          <a:p>
+            <a:r>
+              <a:rPr lang="en-ZA" dirty="0"/>
+              <a:t>Google cardboard for immersive graph </a:t>
+            </a:r>
+            <a:r>
+              <a:rPr lang="en-ZA" dirty="0" smtClean="0"/>
+              <a:t>rendering</a:t>
+            </a:r>
+          </a:p>
+          <a:p>
+            <a:r>
+              <a:rPr lang="en-ZA" dirty="0"/>
+              <a:t>Multithread.js to run multiple processes for performance optimization (faster sync &amp; graph generation</a:t>
             </a:r>
           </a:p>
         </p:txBody>
@@ -11688,7 +11617,7 @@
     </p:spTree>
     <p:extLst>
       <p:ext uri="{BB962C8B-B14F-4D97-AF65-F5344CB8AC3E}">
-        <p14:creationId xmlns:p14="http://schemas.microsoft.com/office/powerpoint/2010/main" val="354062543"/>
+        <p14:creationId xmlns:p14="http://schemas.microsoft.com/office/powerpoint/2010/main" val="1217948826"/>
       </p:ext>
     </p:extLst>
   </p:cSld>
@@ -11732,7 +11661,7 @@
           <a:p>
             <a:r>
               <a:rPr lang="en-ZA" dirty="0" smtClean="0"/>
-              <a:t>Implementation Details</a:t>
+              <a:t>Initial Design Patterns</a:t>
             </a:r>
             <a:endParaRPr lang="en-ZA" dirty="0"/>
           </a:p>
@@ -11754,66 +11683,47 @@
           <a:lstStyle/>
           <a:p>
             <a:r>
-              <a:rPr lang="en-ZA" dirty="0"/>
-              <a:t>Sigma graph modelling library (java script</a:t>
-            </a:r>
-            <a:r>
               <a:rPr lang="en-ZA" dirty="0" smtClean="0"/>
-              <a:t>)</a:t>
-            </a:r>
-          </a:p>
-          <a:p>
-            <a:r>
-              <a:rPr lang="en-ZA" dirty="0"/>
-              <a:t>Create cross platform </a:t>
-            </a:r>
+              <a:t>Observer</a:t>
+            </a:r>
+          </a:p>
+          <a:p>
             <a:r>
               <a:rPr lang="en-ZA" dirty="0" smtClean="0"/>
-              <a:t>application</a:t>
-            </a:r>
-          </a:p>
-          <a:p>
-            <a:r>
-              <a:rPr lang="en-ZA" dirty="0"/>
-              <a:t>Native cross platforms application (React-Native/Other</a:t>
-            </a:r>
+              <a:t>Command</a:t>
+            </a:r>
+          </a:p>
+          <a:p>
             <a:r>
               <a:rPr lang="en-ZA" dirty="0" smtClean="0"/>
-              <a:t>)</a:t>
-            </a:r>
-          </a:p>
-          <a:p>
-            <a:r>
-              <a:rPr lang="en-ZA" dirty="0"/>
-              <a:t>3JS for creation of 3D </a:t>
-            </a:r>
+              <a:t>Memento</a:t>
+            </a:r>
+          </a:p>
+          <a:p>
             <a:r>
               <a:rPr lang="en-ZA" dirty="0" smtClean="0"/>
-              <a:t>space</a:t>
-            </a:r>
-          </a:p>
-          <a:p>
-            <a:r>
-              <a:rPr lang="en-ZA" dirty="0"/>
-              <a:t>Google cardboard for immersive graph </a:t>
-            </a:r>
+              <a:t>State</a:t>
+            </a:r>
+          </a:p>
+          <a:p>
             <a:r>
               <a:rPr lang="en-ZA" dirty="0" smtClean="0"/>
-              <a:t>rendering</a:t>
-            </a:r>
-          </a:p>
-          <a:p>
-            <a:r>
-              <a:rPr lang="en-ZA" dirty="0"/>
-              <a:t>Multithread.js to run multiple processes for performance optimization (faster sync &amp; graph generation</a:t>
-            </a:r>
+              <a:t>Interpreter</a:t>
+            </a:r>
+          </a:p>
+          <a:p>
+            <a:r>
+              <a:rPr lang="en-ZA" dirty="0" smtClean="0"/>
+              <a:t>Mediator</a:t>
+            </a:r>
+            <a:endParaRPr lang="en-ZA" dirty="0"/>
           </a:p>
         </p:txBody>
       </p:sp>
     </p:spTree>
     <p:extLst>
       <p:ext uri="{BB962C8B-B14F-4D97-AF65-F5344CB8AC3E}">
-        <p14:creationId xmlns:p14="http://schemas.microsoft.com/office/powerpoint/2010/main" val="1217948826"/>
+        <p14:creationId xmlns:p14="http://schemas.microsoft.com/office/powerpoint/2010/main" val="1242784525"/>
       </p:ext>
     </p:extLst>
   </p:cSld>
@@ -11857,7 +11767,22 @@
           <a:p>
             <a:r>
               <a:rPr lang="en-ZA" dirty="0" smtClean="0"/>
-              <a:t>Initial Design Patterns</a:t>
+              <a:t>External Interface Requirements</a:t>
+            </a:r>
+            <a:br>
+              <a:rPr lang="en-ZA" dirty="0" smtClean="0"/>
+            </a:br>
+            <a:r>
+              <a:rPr lang="en-ZA" dirty="0" smtClean="0"/>
+              <a:t>(</a:t>
+            </a:r>
+            <a:r>
+              <a:rPr lang="en-ZA" dirty="0"/>
+              <a:t>Interface </a:t>
+            </a:r>
+            <a:r>
+              <a:rPr lang="en-ZA" dirty="0" smtClean="0"/>
+              <a:t>Requirements)</a:t>
             </a:r>
             <a:endParaRPr lang="en-ZA" dirty="0"/>
           </a:p>
@@ -11879,32 +11804,12 @@
           <a:lstStyle/>
           <a:p>
             <a:r>
+              <a:rPr lang="en-ZA" dirty="0"/>
+              <a:t>The main user interface will be in the form of a virtual reality space. Through this space, the user will be able to make various interactions with the system by means of hand gestures. The application itself will have a graphical user interface which the user can make use of in order to alter various configurations of the </a:t>
+            </a:r>
+            <a:r>
               <a:rPr lang="en-ZA" dirty="0" smtClean="0"/>
-              <a:t>Observer</a:t>
-            </a:r>
-          </a:p>
-          <a:p>
-            <a:r>
-              <a:rPr lang="en-ZA" dirty="0" smtClean="0"/>
-              <a:t>Command</a:t>
-            </a:r>
-          </a:p>
-          <a:p>
-            <a:r>
-              <a:rPr lang="en-ZA" dirty="0" smtClean="0"/>
-              <a:t>Memento</a:t>
-            </a:r>
-          </a:p>
-          <a:p>
-            <a:r>
-              <a:rPr lang="en-ZA" dirty="0" smtClean="0"/>
-              <a:t>State</a:t>
-            </a:r>
-          </a:p>
-          <a:p>
-            <a:r>
-              <a:rPr lang="en-ZA" dirty="0" smtClean="0"/>
-              <a:t>Interpreter</a:t>
+              <a:t>application.</a:t>
             </a:r>
             <a:endParaRPr lang="en-ZA" dirty="0"/>
           </a:p>
@@ -11913,7 +11818,7 @@
     </p:spTree>
     <p:extLst>
       <p:ext uri="{BB962C8B-B14F-4D97-AF65-F5344CB8AC3E}">
-        <p14:creationId xmlns:p14="http://schemas.microsoft.com/office/powerpoint/2010/main" val="1242784525"/>
+        <p14:creationId xmlns:p14="http://schemas.microsoft.com/office/powerpoint/2010/main" val="2075585378"/>
       </p:ext>
     </p:extLst>
   </p:cSld>
@@ -12160,7 +12065,7 @@
   <a:extraClrSchemeLst/>
   <a:extLst>
     <a:ext uri="{05A4C25C-085E-4340-85A3-A5531E510DB2}">
-      <thm15:themeFamily xmlns:thm15="http://schemas.microsoft.com/office/thememl/2012/main" xmlns="" name="Wisp" id="{7CB32D59-10C0-40DD-B7BD-2E94284A981C}" vid="{4F34B87B-9C7A-41AE-A6CB-48536223DFFD}"/>
+      <thm15:themeFamily xmlns="" xmlns:thm15="http://schemas.microsoft.com/office/thememl/2012/main" name="Wisp" id="{7CB32D59-10C0-40DD-B7BD-2E94284A981C}" vid="{4F34B87B-9C7A-41AE-A6CB-48536223DFFD}"/>
     </a:ext>
   </a:extLst>
 </a:theme>

</xml_diff>